<commit_message>
Fix issue in make_scene when several random trees are required
</commit_message>
<xml_diff>
--- a/man/figures/logo.pptx
+++ b/man/figures/logo.pptx
@@ -243,7 +243,7 @@
           <a:p>
             <a:fld id="{3F4DB145-733B-4B68-AB4C-89F6241C9FA2}" type="datetimeFigureOut">
               <a:rPr lang="fr-FR" smtClean="0"/>
-              <a:t>08/01/2019</a:t>
+              <a:t>10/01/2019</a:t>
             </a:fld>
             <a:endParaRPr lang="fr-FR"/>
           </a:p>
@@ -413,7 +413,7 @@
           <a:p>
             <a:fld id="{3F4DB145-733B-4B68-AB4C-89F6241C9FA2}" type="datetimeFigureOut">
               <a:rPr lang="fr-FR" smtClean="0"/>
-              <a:t>08/01/2019</a:t>
+              <a:t>10/01/2019</a:t>
             </a:fld>
             <a:endParaRPr lang="fr-FR"/>
           </a:p>
@@ -593,7 +593,7 @@
           <a:p>
             <a:fld id="{3F4DB145-733B-4B68-AB4C-89F6241C9FA2}" type="datetimeFigureOut">
               <a:rPr lang="fr-FR" smtClean="0"/>
-              <a:t>08/01/2019</a:t>
+              <a:t>10/01/2019</a:t>
             </a:fld>
             <a:endParaRPr lang="fr-FR"/>
           </a:p>
@@ -763,7 +763,7 @@
           <a:p>
             <a:fld id="{3F4DB145-733B-4B68-AB4C-89F6241C9FA2}" type="datetimeFigureOut">
               <a:rPr lang="fr-FR" smtClean="0"/>
-              <a:t>08/01/2019</a:t>
+              <a:t>10/01/2019</a:t>
             </a:fld>
             <a:endParaRPr lang="fr-FR"/>
           </a:p>
@@ -1009,7 +1009,7 @@
           <a:p>
             <a:fld id="{3F4DB145-733B-4B68-AB4C-89F6241C9FA2}" type="datetimeFigureOut">
               <a:rPr lang="fr-FR" smtClean="0"/>
-              <a:t>08/01/2019</a:t>
+              <a:t>10/01/2019</a:t>
             </a:fld>
             <a:endParaRPr lang="fr-FR"/>
           </a:p>
@@ -1241,7 +1241,7 @@
           <a:p>
             <a:fld id="{3F4DB145-733B-4B68-AB4C-89F6241C9FA2}" type="datetimeFigureOut">
               <a:rPr lang="fr-FR" smtClean="0"/>
-              <a:t>08/01/2019</a:t>
+              <a:t>10/01/2019</a:t>
             </a:fld>
             <a:endParaRPr lang="fr-FR"/>
           </a:p>
@@ -1608,7 +1608,7 @@
           <a:p>
             <a:fld id="{3F4DB145-733B-4B68-AB4C-89F6241C9FA2}" type="datetimeFigureOut">
               <a:rPr lang="fr-FR" smtClean="0"/>
-              <a:t>08/01/2019</a:t>
+              <a:t>10/01/2019</a:t>
             </a:fld>
             <a:endParaRPr lang="fr-FR"/>
           </a:p>
@@ -1726,7 +1726,7 @@
           <a:p>
             <a:fld id="{3F4DB145-733B-4B68-AB4C-89F6241C9FA2}" type="datetimeFigureOut">
               <a:rPr lang="fr-FR" smtClean="0"/>
-              <a:t>08/01/2019</a:t>
+              <a:t>10/01/2019</a:t>
             </a:fld>
             <a:endParaRPr lang="fr-FR"/>
           </a:p>
@@ -1821,7 +1821,7 @@
           <a:p>
             <a:fld id="{3F4DB145-733B-4B68-AB4C-89F6241C9FA2}" type="datetimeFigureOut">
               <a:rPr lang="fr-FR" smtClean="0"/>
-              <a:t>08/01/2019</a:t>
+              <a:t>10/01/2019</a:t>
             </a:fld>
             <a:endParaRPr lang="fr-FR"/>
           </a:p>
@@ -2098,7 +2098,7 @@
           <a:p>
             <a:fld id="{3F4DB145-733B-4B68-AB4C-89F6241C9FA2}" type="datetimeFigureOut">
               <a:rPr lang="fr-FR" smtClean="0"/>
-              <a:t>08/01/2019</a:t>
+              <a:t>10/01/2019</a:t>
             </a:fld>
             <a:endParaRPr lang="fr-FR"/>
           </a:p>
@@ -2351,7 +2351,7 @@
           <a:p>
             <a:fld id="{3F4DB145-733B-4B68-AB4C-89F6241C9FA2}" type="datetimeFigureOut">
               <a:rPr lang="fr-FR" smtClean="0"/>
-              <a:t>08/01/2019</a:t>
+              <a:t>10/01/2019</a:t>
             </a:fld>
             <a:endParaRPr lang="fr-FR"/>
           </a:p>
@@ -2564,7 +2564,7 @@
           <a:p>
             <a:fld id="{3F4DB145-733B-4B68-AB4C-89F6241C9FA2}" type="datetimeFigureOut">
               <a:rPr lang="fr-FR" smtClean="0"/>
-              <a:t>08/01/2019</a:t>
+              <a:t>10/01/2019</a:t>
             </a:fld>
             <a:endParaRPr lang="fr-FR"/>
           </a:p>
@@ -2977,7 +2977,7 @@
         </p:nvGrpSpPr>
         <p:grpSpPr>
           <a:xfrm>
-            <a:off x="4258586" y="576966"/>
+            <a:off x="4223751" y="812097"/>
             <a:ext cx="4711148" cy="5024796"/>
             <a:chOff x="4258586" y="576966"/>
             <a:chExt cx="4711148" cy="5024796"/>

</xml_diff>